<commit_message>
Added development and UI
sections to the powerpoint
</commit_message>
<xml_diff>
--- a/Presentation/Presentation Two/PresentationRevised.pptx
+++ b/Presentation/Presentation Two/PresentationRevised.pptx
@@ -9604,6 +9604,30 @@
           </a:bodyPr>
           <a:lstStyle/>
           <a:p>
+            <a:r>
+              <a:rPr lang="en-US" sz="2200" dirty="0"/>
+              <a:t>Kanban Method</a:t>
+            </a:r>
+          </a:p>
+          <a:p>
+            <a:r>
+              <a:rPr lang="en-US" sz="2200" dirty="0"/>
+              <a:t>Agile Process</a:t>
+            </a:r>
+          </a:p>
+          <a:p>
+            <a:r>
+              <a:rPr lang="en-US" sz="2200" dirty="0"/>
+              <a:t>Flexibility with client and requirements</a:t>
+            </a:r>
+          </a:p>
+          <a:p>
+            <a:endParaRPr lang="en-US" sz="2200" dirty="0"/>
+          </a:p>
+          <a:p>
+            <a:pPr marL="0" indent="0">
+              <a:buNone/>
+            </a:pPr>
             <a:endParaRPr lang="en-US" sz="2200" dirty="0"/>
           </a:p>
         </p:txBody>
@@ -9688,9 +9712,38 @@
           <a:lstStyle/>
           <a:p>
             <a:r>
-              <a:rPr lang="en-US" sz="2200" dirty="0" smtClean="0"/>
+              <a:rPr lang="en-US" sz="2200" dirty="0"/>
               <a:t>Demonstration</a:t>
             </a:r>
+          </a:p>
+          <a:p>
+            <a:r>
+              <a:rPr lang="en-US" sz="2200" dirty="0"/>
+              <a:t>Consistent templates</a:t>
+            </a:r>
+          </a:p>
+          <a:p>
+            <a:r>
+              <a:rPr lang="en-US" sz="2200" dirty="0"/>
+              <a:t>Demographic in mind for easy usability</a:t>
+            </a:r>
+          </a:p>
+          <a:p>
+            <a:r>
+              <a:rPr lang="en-US" sz="2200" dirty="0"/>
+              <a:t>Large buttons and text</a:t>
+            </a:r>
+          </a:p>
+          <a:p>
+            <a:r>
+              <a:rPr lang="en-US" sz="2200" dirty="0"/>
+              <a:t>Buttons and links in consistent areas</a:t>
+            </a:r>
+          </a:p>
+          <a:p>
+            <a:pPr marL="0" indent="0">
+              <a:buNone/>
+            </a:pPr>
             <a:endParaRPr lang="en-US" sz="2200" dirty="0"/>
           </a:p>
         </p:txBody>
@@ -10339,12 +10392,6 @@
 </file>
 
 <file path=customXml/item1.xml><?xml version="1.0" encoding="utf-8"?>
-<p:properties xmlns:p="http://schemas.microsoft.com/office/2006/metadata/properties" xmlns:xsi="http://www.w3.org/2001/XMLSchema-instance" xmlns:pc="http://schemas.microsoft.com/office/infopath/2007/PartnerControls">
-  <documentManagement/>
-</p:properties>
-</file>
-
-<file path=customXml/item2.xml><?xml version="1.0" encoding="utf-8"?>
 <ct:contentTypeSchema xmlns:ct="http://schemas.microsoft.com/office/2006/metadata/contentType" xmlns:ma="http://schemas.microsoft.com/office/2006/metadata/properties/metaAttributes" ct:_="" ma:_="" ma:contentTypeName="Document" ma:contentTypeID="0x0101004ED25B20BF7EED4EBDC04666034D76BA" ma:contentTypeVersion="0" ma:contentTypeDescription="Create a new document." ma:contentTypeScope="" ma:versionID="dad62bfcb13c80e5b08cd05c7aa1420f">
   <xsd:schema xmlns:xsd="http://www.w3.org/2001/XMLSchema" xmlns:xs="http://www.w3.org/2001/XMLSchema" xmlns:p="http://schemas.microsoft.com/office/2006/metadata/properties" targetNamespace="http://schemas.microsoft.com/office/2006/metadata/properties" ma:root="true" ma:fieldsID="8c180a8389243951cd65b31068827aa8">
     <xsd:element name="properties">
@@ -10458,6 +10505,12 @@
 </ct:contentTypeSchema>
 </file>
 
+<file path=customXml/item2.xml><?xml version="1.0" encoding="utf-8"?>
+<p:properties xmlns:p="http://schemas.microsoft.com/office/2006/metadata/properties" xmlns:xsi="http://www.w3.org/2001/XMLSchema-instance" xmlns:pc="http://schemas.microsoft.com/office/infopath/2007/PartnerControls">
+  <documentManagement/>
+</p:properties>
+</file>
+
 <file path=customXml/item3.xml><?xml version="1.0" encoding="utf-8"?>
 <?mso-contentType ?>
 <FormTemplates xmlns="http://schemas.microsoft.com/sharepoint/v3/contenttype/forms">
@@ -10468,21 +10521,6 @@
 </file>
 
 <file path=customXml/itemProps1.xml><?xml version="1.0" encoding="utf-8"?>
-<ds:datastoreItem xmlns:ds="http://schemas.openxmlformats.org/officeDocument/2006/customXml" ds:itemID="{120AB2EF-83B6-48FA-912A-3F47801185B6}">
-  <ds:schemaRefs>
-    <ds:schemaRef ds:uri="http://purl.org/dc/terms/"/>
-    <ds:schemaRef ds:uri="http://schemas.microsoft.com/office/2006/metadata/properties"/>
-    <ds:schemaRef ds:uri="http://purl.org/dc/elements/1.1/"/>
-    <ds:schemaRef ds:uri="http://schemas.microsoft.com/office/2006/documentManagement/types"/>
-    <ds:schemaRef ds:uri="http://schemas.openxmlformats.org/package/2006/metadata/core-properties"/>
-    <ds:schemaRef ds:uri="http://purl.org/dc/dcmitype/"/>
-    <ds:schemaRef ds:uri="http://schemas.microsoft.com/office/infopath/2007/PartnerControls"/>
-    <ds:schemaRef ds:uri="http://www.w3.org/XML/1998/namespace"/>
-  </ds:schemaRefs>
-</ds:datastoreItem>
-</file>
-
-<file path=customXml/itemProps2.xml><?xml version="1.0" encoding="utf-8"?>
 <ds:datastoreItem xmlns:ds="http://schemas.openxmlformats.org/officeDocument/2006/customXml" ds:itemID="{86D6B8AF-DEC8-4C7B-A23B-D79B3CD44F3D}">
   <ds:schemaRefs>
     <ds:schemaRef ds:uri="http://schemas.microsoft.com/office/2006/metadata/contentType"/>
@@ -10498,6 +10536,21 @@
 </ds:datastoreItem>
 </file>
 
+<file path=customXml/itemProps2.xml><?xml version="1.0" encoding="utf-8"?>
+<ds:datastoreItem xmlns:ds="http://schemas.openxmlformats.org/officeDocument/2006/customXml" ds:itemID="{120AB2EF-83B6-48FA-912A-3F47801185B6}">
+  <ds:schemaRefs>
+    <ds:schemaRef ds:uri="http://purl.org/dc/terms/"/>
+    <ds:schemaRef ds:uri="http://schemas.microsoft.com/office/2006/metadata/properties"/>
+    <ds:schemaRef ds:uri="http://purl.org/dc/elements/1.1/"/>
+    <ds:schemaRef ds:uri="http://schemas.microsoft.com/office/2006/documentManagement/types"/>
+    <ds:schemaRef ds:uri="http://schemas.openxmlformats.org/package/2006/metadata/core-properties"/>
+    <ds:schemaRef ds:uri="http://purl.org/dc/dcmitype/"/>
+    <ds:schemaRef ds:uri="http://schemas.microsoft.com/office/infopath/2007/PartnerControls"/>
+    <ds:schemaRef ds:uri="http://www.w3.org/XML/1998/namespace"/>
+  </ds:schemaRefs>
+</ds:datastoreItem>
+</file>
+
 <file path=customXml/itemProps3.xml><?xml version="1.0" encoding="utf-8"?>
 <ds:datastoreItem xmlns:ds="http://schemas.openxmlformats.org/officeDocument/2006/customXml" ds:itemID="{3B9A03BE-BDD2-4450-8C63-538E1F1E17CE}">
   <ds:schemaRefs>

</xml_diff>

<commit_message>
Added conclusion to iteration 3 presentation
</commit_message>
<xml_diff>
--- a/Presentation/Presentation Two/PresentationRevised.pptx
+++ b/Presentation/Presentation Two/PresentationRevised.pptx
@@ -8825,7 +8825,12 @@
             <p:ph idx="1"/>
           </p:nvPr>
         </p:nvSpPr>
-        <p:spPr/>
+        <p:spPr>
+          <a:xfrm>
+            <a:off x="2589212" y="2133600"/>
+            <a:ext cx="8915400" cy="4267200"/>
+          </a:xfrm>
+        </p:spPr>
         <p:txBody>
           <a:bodyPr>
             <a:normAutofit/>
@@ -8834,28 +8839,58 @@
           <a:p>
             <a:r>
               <a:rPr lang="en-US" sz="2200" dirty="0" smtClean="0"/>
-              <a:t>PIE is a site to promote healthy social activities for the elderly</a:t>
-            </a:r>
-          </a:p>
-          <a:p>
+              <a:t>PIE’s goal is to </a:t>
+            </a:r>
             <a:r>
               <a:rPr lang="en-US" sz="2200" dirty="0" smtClean="0"/>
-              <a:t>Completed tasks:</a:t>
-            </a:r>
+              <a:t>promote healthy social </a:t>
+            </a:r>
+            <a:r>
+              <a:rPr lang="en-US" sz="2200" dirty="0" smtClean="0"/>
+              <a:t>activities</a:t>
+            </a:r>
+          </a:p>
+          <a:p>
+            <a:r>
+              <a:rPr lang="en-US" sz="2200" dirty="0" smtClean="0"/>
+              <a:t>Completed </a:t>
+            </a:r>
+            <a:r>
+              <a:rPr lang="en-US" sz="2200" dirty="0" smtClean="0"/>
+              <a:t>tasks</a:t>
+            </a:r>
+            <a:r>
+              <a:rPr lang="en-US" sz="2200" dirty="0" smtClean="0"/>
+              <a:t>:</a:t>
+            </a:r>
+          </a:p>
+          <a:p>
+            <a:pPr lvl="1"/>
+            <a:r>
+              <a:rPr lang="en-US" sz="2000" dirty="0" smtClean="0"/>
+              <a:t>Hosting the site on a testing server</a:t>
+            </a:r>
+            <a:endParaRPr lang="en-US" sz="2000" dirty="0" smtClean="0"/>
           </a:p>
           <a:p>
             <a:pPr lvl="1" fontAlgn="base"/>
             <a:r>
-              <a:rPr lang="en-US" sz="2200" dirty="0"/>
-              <a:t>Storing user information in a database​</a:t>
-            </a:r>
+              <a:rPr lang="en-US" sz="2000" dirty="0" smtClean="0"/>
+              <a:t>Storing and retrieving user and event information</a:t>
+            </a:r>
+            <a:endParaRPr lang="en-US" sz="2000" dirty="0"/>
           </a:p>
           <a:p>
             <a:pPr lvl="1" fontAlgn="base"/>
             <a:r>
-              <a:rPr lang="en-US" sz="2200" dirty="0"/>
-              <a:t>Creating an easy-to-navigate interface​</a:t>
-            </a:r>
+              <a:rPr lang="en-US" sz="2000" dirty="0"/>
+              <a:t>Creating </a:t>
+            </a:r>
+            <a:r>
+              <a:rPr lang="en-US" sz="2000" dirty="0" smtClean="0"/>
+              <a:t>easy-to-navigate pages</a:t>
+            </a:r>
+            <a:endParaRPr lang="en-US" sz="2000" dirty="0"/>
           </a:p>
           <a:p>
             <a:r>
@@ -8866,17 +8901,32 @@
           <a:p>
             <a:pPr lvl="1"/>
             <a:r>
-              <a:rPr lang="en-US" sz="2200" dirty="0" smtClean="0"/>
-              <a:t>Creating a calendar to organize activities</a:t>
+              <a:rPr lang="en-US" sz="2000" dirty="0" smtClean="0"/>
+              <a:t>Creating a calendar </a:t>
+            </a:r>
+            <a:r>
+              <a:rPr lang="en-US" sz="2000" dirty="0" smtClean="0"/>
+              <a:t>for organizing </a:t>
+            </a:r>
+            <a:r>
+              <a:rPr lang="en-US" sz="2000" dirty="0" smtClean="0"/>
+              <a:t>activities</a:t>
             </a:r>
           </a:p>
           <a:p>
             <a:pPr lvl="1"/>
             <a:r>
-              <a:rPr lang="en-US" sz="2200" dirty="0" smtClean="0"/>
-              <a:t>Hosting the website</a:t>
-            </a:r>
-            <a:endParaRPr lang="en-US" sz="2200" dirty="0"/>
+              <a:rPr lang="en-US" sz="2000" dirty="0" smtClean="0"/>
+              <a:t>Online hosting</a:t>
+            </a:r>
+          </a:p>
+          <a:p>
+            <a:pPr lvl="1"/>
+            <a:r>
+              <a:rPr lang="en-US" sz="2000" dirty="0" smtClean="0"/>
+              <a:t>User testing and updating</a:t>
+            </a:r>
+            <a:endParaRPr lang="en-US" sz="2000" dirty="0"/>
           </a:p>
           <a:p>
             <a:pPr lvl="1"/>
@@ -10506,18 +10556,18 @@
 </file>
 
 <file path=customXml/item2.xml><?xml version="1.0" encoding="utf-8"?>
-<p:properties xmlns:p="http://schemas.microsoft.com/office/2006/metadata/properties" xmlns:xsi="http://www.w3.org/2001/XMLSchema-instance" xmlns:pc="http://schemas.microsoft.com/office/infopath/2007/PartnerControls">
-  <documentManagement/>
-</p:properties>
-</file>
-
-<file path=customXml/item3.xml><?xml version="1.0" encoding="utf-8"?>
 <?mso-contentType ?>
 <FormTemplates xmlns="http://schemas.microsoft.com/sharepoint/v3/contenttype/forms">
   <Display>DocumentLibraryForm</Display>
   <Edit>DocumentLibraryForm</Edit>
   <New>DocumentLibraryForm</New>
 </FormTemplates>
+</file>
+
+<file path=customXml/item3.xml><?xml version="1.0" encoding="utf-8"?>
+<p:properties xmlns:p="http://schemas.microsoft.com/office/2006/metadata/properties" xmlns:xsi="http://www.w3.org/2001/XMLSchema-instance" xmlns:pc="http://schemas.microsoft.com/office/infopath/2007/PartnerControls">
+  <documentManagement/>
+</p:properties>
 </file>
 
 <file path=customXml/itemProps1.xml><?xml version="1.0" encoding="utf-8"?>
@@ -10537,6 +10587,14 @@
 </file>
 
 <file path=customXml/itemProps2.xml><?xml version="1.0" encoding="utf-8"?>
+<ds:datastoreItem xmlns:ds="http://schemas.openxmlformats.org/officeDocument/2006/customXml" ds:itemID="{3B9A03BE-BDD2-4450-8C63-538E1F1E17CE}">
+  <ds:schemaRefs>
+    <ds:schemaRef ds:uri="http://schemas.microsoft.com/sharepoint/v3/contenttype/forms"/>
+  </ds:schemaRefs>
+</ds:datastoreItem>
+</file>
+
+<file path=customXml/itemProps3.xml><?xml version="1.0" encoding="utf-8"?>
 <ds:datastoreItem xmlns:ds="http://schemas.openxmlformats.org/officeDocument/2006/customXml" ds:itemID="{120AB2EF-83B6-48FA-912A-3F47801185B6}">
   <ds:schemaRefs>
     <ds:schemaRef ds:uri="http://purl.org/dc/terms/"/>
@@ -10549,12 +10607,4 @@
     <ds:schemaRef ds:uri="http://www.w3.org/XML/1998/namespace"/>
   </ds:schemaRefs>
 </ds:datastoreItem>
-</file>
-
-<file path=customXml/itemProps3.xml><?xml version="1.0" encoding="utf-8"?>
-<ds:datastoreItem xmlns:ds="http://schemas.openxmlformats.org/officeDocument/2006/customXml" ds:itemID="{3B9A03BE-BDD2-4450-8C63-538E1F1E17CE}">
-  <ds:schemaRefs>
-    <ds:schemaRef ds:uri="http://schemas.microsoft.com/sharepoint/v3/contenttype/forms"/>
-  </ds:schemaRefs>
-</ds:datastoreItem>
 </file>
</xml_diff>